<commit_message>
added types of hosting
</commit_message>
<xml_diff>
--- a/AWS.pptx
+++ b/AWS.pptx
@@ -6,22 +6,27 @@
     <p:sldMasterId id="2147483660" r:id="rId2"/>
   </p:sldMasterIdLst>
   <p:notesMasterIdLst>
-    <p:notesMasterId r:id="rId16"/>
+    <p:notesMasterId r:id="rId21"/>
   </p:notesMasterIdLst>
   <p:sldIdLst>
     <p:sldId id="256" r:id="rId3"/>
-    <p:sldId id="257" r:id="rId4"/>
-    <p:sldId id="263" r:id="rId5"/>
-    <p:sldId id="287" r:id="rId6"/>
-    <p:sldId id="258" r:id="rId7"/>
-    <p:sldId id="259" r:id="rId8"/>
-    <p:sldId id="260" r:id="rId9"/>
-    <p:sldId id="261" r:id="rId10"/>
-    <p:sldId id="289" r:id="rId11"/>
-    <p:sldId id="264" r:id="rId12"/>
-    <p:sldId id="265" r:id="rId13"/>
-    <p:sldId id="288" r:id="rId14"/>
-    <p:sldId id="262" r:id="rId15"/>
+    <p:sldId id="290" r:id="rId4"/>
+    <p:sldId id="291" r:id="rId5"/>
+    <p:sldId id="292" r:id="rId6"/>
+    <p:sldId id="293" r:id="rId7"/>
+    <p:sldId id="294" r:id="rId8"/>
+    <p:sldId id="257" r:id="rId9"/>
+    <p:sldId id="263" r:id="rId10"/>
+    <p:sldId id="287" r:id="rId11"/>
+    <p:sldId id="258" r:id="rId12"/>
+    <p:sldId id="259" r:id="rId13"/>
+    <p:sldId id="260" r:id="rId14"/>
+    <p:sldId id="261" r:id="rId15"/>
+    <p:sldId id="289" r:id="rId16"/>
+    <p:sldId id="264" r:id="rId17"/>
+    <p:sldId id="265" r:id="rId18"/>
+    <p:sldId id="288" r:id="rId19"/>
+    <p:sldId id="262" r:id="rId20"/>
   </p:sldIdLst>
   <p:sldSz cx="12192000" cy="6858000"/>
   <p:notesSz cx="6858000" cy="9144000"/>
@@ -210,7 +215,7 @@
           <a:p>
             <a:fld id="{C062F290-662F-4A06-98FA-E68906C57140}" type="datetimeFigureOut">
               <a:rPr lang="en-US" smtClean="0"/>
-              <a:t>2/8/2019</a:t>
+              <a:t>2/9/2019</a:t>
             </a:fld>
             <a:endParaRPr lang="en-US"/>
           </a:p>
@@ -920,7 +925,7 @@
                 <a:buFontTx/>
                 <a:buNone/>
               </a:pPr>
-              <a:t>9</a:t>
+              <a:t>14</a:t>
             </a:fld>
             <a:endParaRPr lang="en-IN" altLang="en-US" sz="1400"/>
           </a:p>
@@ -1173,7 +1178,7 @@
                 <a:tabLst/>
                 <a:defRPr/>
               </a:pPr>
-              <a:t>12</a:t>
+              <a:t>17</a:t>
             </a:fld>
             <a:endParaRPr kumimoji="0" lang="en-IN" sz="1200" b="0" i="0" u="none" strike="noStrike" kern="1200" cap="none" spc="0" normalizeH="0" baseline="0" noProof="0">
               <a:ln>
@@ -1334,7 +1339,7 @@
           <a:p>
             <a:fld id="{549D1B8E-BBB3-474C-B947-235B16A65669}" type="datetimeFigureOut">
               <a:rPr lang="en-US" smtClean="0"/>
-              <a:t>2/8/2019</a:t>
+              <a:t>2/9/2019</a:t>
             </a:fld>
             <a:endParaRPr lang="en-US"/>
           </a:p>
@@ -1502,7 +1507,7 @@
           <a:p>
             <a:fld id="{549D1B8E-BBB3-474C-B947-235B16A65669}" type="datetimeFigureOut">
               <a:rPr lang="en-US" smtClean="0"/>
-              <a:t>2/8/2019</a:t>
+              <a:t>2/9/2019</a:t>
             </a:fld>
             <a:endParaRPr lang="en-US"/>
           </a:p>
@@ -1680,7 +1685,7 @@
           <a:p>
             <a:fld id="{549D1B8E-BBB3-474C-B947-235B16A65669}" type="datetimeFigureOut">
               <a:rPr lang="en-US" smtClean="0"/>
-              <a:t>2/8/2019</a:t>
+              <a:t>2/9/2019</a:t>
             </a:fld>
             <a:endParaRPr lang="en-US"/>
           </a:p>
@@ -3553,7 +3558,7 @@
           <a:p>
             <a:fld id="{785C0080-8258-4E3D-A8FE-13915FCA9C1A}" type="datetimeFigureOut">
               <a:rPr lang="en-IN" smtClean="0"/>
-              <a:t>08-02-2019</a:t>
+              <a:t>09-02-2019</a:t>
             </a:fld>
             <a:endParaRPr lang="en-IN"/>
           </a:p>
@@ -3699,7 +3704,7 @@
           <a:p>
             <a:fld id="{785C0080-8258-4E3D-A8FE-13915FCA9C1A}" type="datetimeFigureOut">
               <a:rPr lang="en-IN" smtClean="0"/>
-              <a:t>08-02-2019</a:t>
+              <a:t>09-02-2019</a:t>
             </a:fld>
             <a:endParaRPr lang="en-IN"/>
           </a:p>
@@ -5573,7 +5578,7 @@
           <a:p>
             <a:fld id="{785C0080-8258-4E3D-A8FE-13915FCA9C1A}" type="datetimeFigureOut">
               <a:rPr lang="en-IN" smtClean="0"/>
-              <a:t>08-02-2019</a:t>
+              <a:t>09-02-2019</a:t>
             </a:fld>
             <a:endParaRPr lang="en-IN"/>
           </a:p>
@@ -5690,7 +5695,7 @@
           <a:p>
             <a:fld id="{785C0080-8258-4E3D-A8FE-13915FCA9C1A}" type="datetimeFigureOut">
               <a:rPr lang="en-IN" smtClean="0"/>
-              <a:t>08-02-2019</a:t>
+              <a:t>09-02-2019</a:t>
             </a:fld>
             <a:endParaRPr lang="en-IN"/>
           </a:p>
@@ -6233,7 +6238,7 @@
           <a:p>
             <a:fld id="{785C0080-8258-4E3D-A8FE-13915FCA9C1A}" type="datetimeFigureOut">
               <a:rPr lang="en-IN" smtClean="0"/>
-              <a:t>08-02-2019</a:t>
+              <a:t>09-02-2019</a:t>
             </a:fld>
             <a:endParaRPr lang="en-IN"/>
           </a:p>
@@ -6350,7 +6355,7 @@
           <a:p>
             <a:fld id="{785C0080-8258-4E3D-A8FE-13915FCA9C1A}" type="datetimeFigureOut">
               <a:rPr lang="en-IN" smtClean="0"/>
-              <a:t>08-02-2019</a:t>
+              <a:t>09-02-2019</a:t>
             </a:fld>
             <a:endParaRPr lang="en-IN"/>
           </a:p>
@@ -8066,7 +8071,7 @@
           <a:p>
             <a:fld id="{785C0080-8258-4E3D-A8FE-13915FCA9C1A}" type="datetimeFigureOut">
               <a:rPr lang="en-IN" smtClean="0"/>
-              <a:t>08-02-2019</a:t>
+              <a:t>09-02-2019</a:t>
             </a:fld>
             <a:endParaRPr lang="en-IN"/>
           </a:p>
@@ -8222,7 +8227,7 @@
           <a:p>
             <a:fld id="{785C0080-8258-4E3D-A8FE-13915FCA9C1A}" type="datetimeFigureOut">
               <a:rPr lang="en-IN" smtClean="0"/>
-              <a:t>08-02-2019</a:t>
+              <a:t>09-02-2019</a:t>
             </a:fld>
             <a:endParaRPr lang="en-IN"/>
           </a:p>
@@ -10185,7 +10190,7 @@
           <a:p>
             <a:fld id="{549D1B8E-BBB3-474C-B947-235B16A65669}" type="datetimeFigureOut">
               <a:rPr lang="en-US" smtClean="0"/>
-              <a:t>2/8/2019</a:t>
+              <a:t>2/9/2019</a:t>
             </a:fld>
             <a:endParaRPr lang="en-US"/>
           </a:p>
@@ -12010,7 +12015,7 @@
           <a:p>
             <a:fld id="{785C0080-8258-4E3D-A8FE-13915FCA9C1A}" type="datetimeFigureOut">
               <a:rPr lang="en-IN" smtClean="0"/>
-              <a:t>08-02-2019</a:t>
+              <a:t>09-02-2019</a:t>
             </a:fld>
             <a:endParaRPr lang="en-IN"/>
           </a:p>
@@ -12288,7 +12293,7 @@
           <a:p>
             <a:fld id="{785C0080-8258-4E3D-A8FE-13915FCA9C1A}" type="datetimeFigureOut">
               <a:rPr lang="en-IN" smtClean="0"/>
-              <a:t>08-02-2019</a:t>
+              <a:t>09-02-2019</a:t>
             </a:fld>
             <a:endParaRPr lang="en-IN"/>
           </a:p>
@@ -12444,7 +12449,7 @@
           <a:p>
             <a:fld id="{785C0080-8258-4E3D-A8FE-13915FCA9C1A}" type="datetimeFigureOut">
               <a:rPr lang="en-IN" smtClean="0"/>
-              <a:t>08-02-2019</a:t>
+              <a:t>09-02-2019</a:t>
             </a:fld>
             <a:endParaRPr lang="en-IN"/>
           </a:p>
@@ -14373,7 +14378,7 @@
           <a:p>
             <a:fld id="{549D1B8E-BBB3-474C-B947-235B16A65669}" type="datetimeFigureOut">
               <a:rPr lang="en-US" smtClean="0"/>
-              <a:t>2/8/2019</a:t>
+              <a:t>2/9/2019</a:t>
             </a:fld>
             <a:endParaRPr lang="en-US"/>
           </a:p>
@@ -14602,7 +14607,7 @@
           <a:p>
             <a:fld id="{549D1B8E-BBB3-474C-B947-235B16A65669}" type="datetimeFigureOut">
               <a:rPr lang="en-US" smtClean="0"/>
-              <a:t>2/8/2019</a:t>
+              <a:t>2/9/2019</a:t>
             </a:fld>
             <a:endParaRPr lang="en-US"/>
           </a:p>
@@ -14966,7 +14971,7 @@
           <a:p>
             <a:fld id="{549D1B8E-BBB3-474C-B947-235B16A65669}" type="datetimeFigureOut">
               <a:rPr lang="en-US" smtClean="0"/>
-              <a:t>2/8/2019</a:t>
+              <a:t>2/9/2019</a:t>
             </a:fld>
             <a:endParaRPr lang="en-US"/>
           </a:p>
@@ -15083,7 +15088,7 @@
           <a:p>
             <a:fld id="{549D1B8E-BBB3-474C-B947-235B16A65669}" type="datetimeFigureOut">
               <a:rPr lang="en-US" smtClean="0"/>
-              <a:t>2/8/2019</a:t>
+              <a:t>2/9/2019</a:t>
             </a:fld>
             <a:endParaRPr lang="en-US"/>
           </a:p>
@@ -15178,7 +15183,7 @@
           <a:p>
             <a:fld id="{549D1B8E-BBB3-474C-B947-235B16A65669}" type="datetimeFigureOut">
               <a:rPr lang="en-US" smtClean="0"/>
-              <a:t>2/8/2019</a:t>
+              <a:t>2/9/2019</a:t>
             </a:fld>
             <a:endParaRPr lang="en-US"/>
           </a:p>
@@ -15453,7 +15458,7 @@
           <a:p>
             <a:fld id="{549D1B8E-BBB3-474C-B947-235B16A65669}" type="datetimeFigureOut">
               <a:rPr lang="en-US" smtClean="0"/>
-              <a:t>2/8/2019</a:t>
+              <a:t>2/9/2019</a:t>
             </a:fld>
             <a:endParaRPr lang="en-US"/>
           </a:p>
@@ -15705,7 +15710,7 @@
           <a:p>
             <a:fld id="{549D1B8E-BBB3-474C-B947-235B16A65669}" type="datetimeFigureOut">
               <a:rPr lang="en-US" smtClean="0"/>
-              <a:t>2/8/2019</a:t>
+              <a:t>2/9/2019</a:t>
             </a:fld>
             <a:endParaRPr lang="en-US"/>
           </a:p>
@@ -15916,7 +15921,7 @@
           <a:p>
             <a:fld id="{549D1B8E-BBB3-474C-B947-235B16A65669}" type="datetimeFigureOut">
               <a:rPr lang="en-US" smtClean="0"/>
-              <a:t>2/8/2019</a:t>
+              <a:t>2/9/2019</a:t>
             </a:fld>
             <a:endParaRPr lang="en-US"/>
           </a:p>
@@ -18013,7 +18018,7 @@
           <a:p>
             <a:fld id="{785C0080-8258-4E3D-A8FE-13915FCA9C1A}" type="datetimeFigureOut">
               <a:rPr lang="en-IN" smtClean="0"/>
-              <a:t>08-02-2019</a:t>
+              <a:t>09-02-2019</a:t>
             </a:fld>
             <a:endParaRPr lang="en-IN"/>
           </a:p>
@@ -18608,785 +18613,6 @@
       </p:grpSpPr>
       <p:sp>
         <p:nvSpPr>
-          <p:cNvPr id="2" name="Content Placeholder 1"/>
-          <p:cNvSpPr>
-            <a:spLocks noGrp="1"/>
-          </p:cNvSpPr>
-          <p:nvPr>
-            <p:ph idx="1"/>
-          </p:nvPr>
-        </p:nvSpPr>
-        <p:spPr>
-          <a:xfrm>
-            <a:off x="2207568" y="2726922"/>
-            <a:ext cx="8208912" cy="3132348"/>
-          </a:xfrm>
-        </p:spPr>
-        <p:txBody>
-          <a:bodyPr>
-            <a:normAutofit/>
-          </a:bodyPr>
-          <a:lstStyle/>
-          <a:p>
-            <a:r>
-              <a:rPr lang="en-IN" sz="2400" dirty="0">
-                <a:latin typeface="Times New Roman" panose="02020603050405020304" pitchFamily="18" charset="0"/>
-                <a:cs typeface="Times New Roman" panose="02020603050405020304" pitchFamily="18" charset="0"/>
-              </a:rPr>
-              <a:t>Virtualization refers to partitioning one physical server into several virtual servers, or machines.</a:t>
-            </a:r>
-          </a:p>
-          <a:p>
-            <a:pPr marL="0" indent="0">
-              <a:buNone/>
-            </a:pPr>
-            <a:endParaRPr lang="en-IN" sz="2625" dirty="0">
-              <a:latin typeface="Times New Roman" panose="02020603050405020304" pitchFamily="18" charset="0"/>
-              <a:cs typeface="Times New Roman" panose="02020603050405020304" pitchFamily="18" charset="0"/>
-            </a:endParaRPr>
-          </a:p>
-          <a:p>
-            <a:r>
-              <a:rPr lang="en-IN" dirty="0">
-                <a:latin typeface="Times New Roman" panose="02020603050405020304" pitchFamily="18" charset="0"/>
-                <a:cs typeface="Times New Roman" panose="02020603050405020304" pitchFamily="18" charset="0"/>
-              </a:rPr>
-              <a:t> </a:t>
-            </a:r>
-            <a:r>
-              <a:rPr lang="en-IN" sz="2400" dirty="0">
-                <a:latin typeface="Times New Roman" panose="02020603050405020304" pitchFamily="18" charset="0"/>
-                <a:cs typeface="Times New Roman" panose="02020603050405020304" pitchFamily="18" charset="0"/>
-              </a:rPr>
-              <a:t>Each virtual machine can interact independently with other devices, applications, data and users as though it were a separate physical resource.</a:t>
-            </a:r>
-          </a:p>
-          <a:p>
-            <a:endParaRPr lang="en-IN" sz="2400" dirty="0">
-              <a:latin typeface="Times New Roman" panose="02020603050405020304" pitchFamily="18" charset="0"/>
-              <a:cs typeface="Times New Roman" panose="02020603050405020304" pitchFamily="18" charset="0"/>
-            </a:endParaRPr>
-          </a:p>
-        </p:txBody>
-      </p:sp>
-      <p:sp>
-        <p:nvSpPr>
-          <p:cNvPr id="3" name="Title 2"/>
-          <p:cNvSpPr>
-            <a:spLocks noGrp="1"/>
-          </p:cNvSpPr>
-          <p:nvPr>
-            <p:ph type="title"/>
-          </p:nvPr>
-        </p:nvSpPr>
-        <p:spPr/>
-        <p:txBody>
-          <a:bodyPr/>
-          <a:lstStyle/>
-          <a:p>
-            <a:r>
-              <a:rPr lang="en-IN" b="1" dirty="0">
-                <a:latin typeface="Times New Roman" panose="02020603050405020304" pitchFamily="18" charset="0"/>
-                <a:cs typeface="Times New Roman" panose="02020603050405020304" pitchFamily="18" charset="0"/>
-              </a:rPr>
-              <a:t>WHAT IS VIRTUALIZATION?</a:t>
-            </a:r>
-          </a:p>
-        </p:txBody>
-      </p:sp>
-    </p:spTree>
-    <p:extLst>
-      <p:ext uri="{BB962C8B-B14F-4D97-AF65-F5344CB8AC3E}">
-        <p14:creationId xmlns:p14="http://schemas.microsoft.com/office/powerpoint/2010/main" val="3086251152"/>
-      </p:ext>
-    </p:extLst>
-  </p:cSld>
-  <p:clrMapOvr>
-    <a:masterClrMapping/>
-  </p:clrMapOvr>
-  <mc:AlternateContent xmlns:mc="http://schemas.openxmlformats.org/markup-compatibility/2006" xmlns:p14="http://schemas.microsoft.com/office/powerpoint/2010/main">
-    <mc:Choice Requires="p14">
-      <p:transition spd="slow" p14:dur="800">
-        <p14:flythrough/>
-      </p:transition>
-    </mc:Choice>
-    <mc:Fallback xmlns="">
-      <p:transition spd="slow">
-        <p:fade/>
-      </p:transition>
-    </mc:Fallback>
-  </mc:AlternateContent>
-</p:sld>
-</file>
-
-<file path=ppt/slides/slide11.xml><?xml version="1.0" encoding="utf-8"?>
-<p:sld xmlns:a="http://schemas.openxmlformats.org/drawingml/2006/main" xmlns:r="http://schemas.openxmlformats.org/officeDocument/2006/relationships" xmlns:p="http://schemas.openxmlformats.org/presentationml/2006/main">
-  <p:cSld>
-    <p:spTree>
-      <p:nvGrpSpPr>
-        <p:cNvPr id="1" name=""/>
-        <p:cNvGrpSpPr/>
-        <p:nvPr/>
-      </p:nvGrpSpPr>
-      <p:grpSpPr>
-        <a:xfrm>
-          <a:off x="0" y="0"/>
-          <a:ext cx="0" cy="0"/>
-          <a:chOff x="0" y="0"/>
-          <a:chExt cx="0" cy="0"/>
-        </a:xfrm>
-      </p:grpSpPr>
-      <p:sp>
-        <p:nvSpPr>
-          <p:cNvPr id="3" name="Title 2"/>
-          <p:cNvSpPr>
-            <a:spLocks noGrp="1"/>
-          </p:cNvSpPr>
-          <p:nvPr>
-            <p:ph type="title"/>
-          </p:nvPr>
-        </p:nvSpPr>
-        <p:spPr/>
-        <p:txBody>
-          <a:bodyPr/>
-          <a:lstStyle/>
-          <a:p>
-            <a:r>
-              <a:rPr lang="en-IN" b="1" dirty="0">
-                <a:latin typeface="Times New Roman" panose="02020603050405020304" pitchFamily="18" charset="0"/>
-                <a:cs typeface="Times New Roman" panose="02020603050405020304" pitchFamily="18" charset="0"/>
-              </a:rPr>
-              <a:t>HYPERVISORS</a:t>
-            </a:r>
-          </a:p>
-        </p:txBody>
-      </p:sp>
-      <p:pic>
-        <p:nvPicPr>
-          <p:cNvPr id="2" name="Picture 1"/>
-          <p:cNvPicPr>
-            <a:picLocks noChangeAspect="1"/>
-          </p:cNvPicPr>
-          <p:nvPr/>
-        </p:nvPicPr>
-        <p:blipFill>
-          <a:blip r:embed="rId2">
-            <a:extLst>
-              <a:ext uri="{28A0092B-C50C-407E-A947-70E740481C1C}">
-                <a14:useLocalDpi xmlns:a14="http://schemas.microsoft.com/office/drawing/2010/main" val="0"/>
-              </a:ext>
-            </a:extLst>
-          </a:blip>
-          <a:stretch>
-            <a:fillRect/>
-          </a:stretch>
-        </p:blipFill>
-        <p:spPr>
-          <a:xfrm>
-            <a:off x="3359696" y="2420888"/>
-            <a:ext cx="6102678" cy="3810378"/>
-          </a:xfrm>
-          <a:prstGeom prst="rect">
-            <a:avLst/>
-          </a:prstGeom>
-        </p:spPr>
-      </p:pic>
-    </p:spTree>
-    <p:extLst>
-      <p:ext uri="{BB962C8B-B14F-4D97-AF65-F5344CB8AC3E}">
-        <p14:creationId xmlns:p14="http://schemas.microsoft.com/office/powerpoint/2010/main" val="4161623438"/>
-      </p:ext>
-    </p:extLst>
-  </p:cSld>
-  <p:clrMapOvr>
-    <a:masterClrMapping/>
-  </p:clrMapOvr>
-  <mc:AlternateContent xmlns:mc="http://schemas.openxmlformats.org/markup-compatibility/2006" xmlns:p14="http://schemas.microsoft.com/office/powerpoint/2010/main">
-    <mc:Choice Requires="p14">
-      <p:transition spd="slow" p14:dur="800">
-        <p14:flythrough/>
-      </p:transition>
-    </mc:Choice>
-    <mc:Fallback xmlns="">
-      <p:transition spd="slow">
-        <p:fade/>
-      </p:transition>
-    </mc:Fallback>
-  </mc:AlternateContent>
-</p:sld>
-</file>
-
-<file path=ppt/slides/slide12.xml><?xml version="1.0" encoding="utf-8"?>
-<p:sld xmlns:a="http://schemas.openxmlformats.org/drawingml/2006/main" xmlns:r="http://schemas.openxmlformats.org/officeDocument/2006/relationships" xmlns:p="http://schemas.openxmlformats.org/presentationml/2006/main">
-  <p:cSld>
-    <p:spTree>
-      <p:nvGrpSpPr>
-        <p:cNvPr id="1" name=""/>
-        <p:cNvGrpSpPr/>
-        <p:nvPr/>
-      </p:nvGrpSpPr>
-      <p:grpSpPr>
-        <a:xfrm>
-          <a:off x="0" y="0"/>
-          <a:ext cx="0" cy="0"/>
-          <a:chOff x="0" y="0"/>
-          <a:chExt cx="0" cy="0"/>
-        </a:xfrm>
-      </p:grpSpPr>
-      <p:sp>
-        <p:nvSpPr>
-          <p:cNvPr id="2" name="Content Placeholder 1"/>
-          <p:cNvSpPr>
-            <a:spLocks noGrp="1"/>
-          </p:cNvSpPr>
-          <p:nvPr>
-            <p:ph idx="1"/>
-          </p:nvPr>
-        </p:nvSpPr>
-        <p:spPr>
-          <a:xfrm>
-            <a:off x="1981200" y="1916832"/>
-            <a:ext cx="8435280" cy="4752528"/>
-          </a:xfrm>
-        </p:spPr>
-        <p:txBody>
-          <a:bodyPr/>
-          <a:lstStyle/>
-          <a:p>
-            <a:r>
-              <a:rPr lang="en-IN" b="1" dirty="0">
-                <a:latin typeface="Times New Roman" panose="02020603050405020304" pitchFamily="18" charset="0"/>
-                <a:cs typeface="Times New Roman" panose="02020603050405020304" pitchFamily="18" charset="0"/>
-              </a:rPr>
-              <a:t>Memory Isolation</a:t>
-            </a:r>
-          </a:p>
-          <a:p>
-            <a:endParaRPr lang="en-IN" b="1" dirty="0">
-              <a:latin typeface="Times New Roman" panose="02020603050405020304" pitchFamily="18" charset="0"/>
-              <a:cs typeface="Times New Roman" panose="02020603050405020304" pitchFamily="18" charset="0"/>
-            </a:endParaRPr>
-          </a:p>
-        </p:txBody>
-      </p:sp>
-      <p:sp>
-        <p:nvSpPr>
-          <p:cNvPr id="3" name="Title 2"/>
-          <p:cNvSpPr>
-            <a:spLocks noGrp="1"/>
-          </p:cNvSpPr>
-          <p:nvPr>
-            <p:ph type="title"/>
-          </p:nvPr>
-        </p:nvSpPr>
-        <p:spPr/>
-        <p:txBody>
-          <a:bodyPr>
-            <a:normAutofit/>
-          </a:bodyPr>
-          <a:lstStyle/>
-          <a:p>
-            <a:r>
-              <a:rPr lang="en-IN" b="1" dirty="0">
-                <a:latin typeface="Times New Roman" pitchFamily="18" charset="0"/>
-                <a:cs typeface="Times New Roman" pitchFamily="18" charset="0"/>
-              </a:rPr>
-              <a:t>VM ARCHITECTURE AND WORKING</a:t>
-            </a:r>
-          </a:p>
-        </p:txBody>
-      </p:sp>
-      <p:pic>
-        <p:nvPicPr>
-          <p:cNvPr id="2050" name="Picture 2"/>
-          <p:cNvPicPr>
-            <a:picLocks noChangeAspect="1" noChangeArrowheads="1"/>
-          </p:cNvPicPr>
-          <p:nvPr/>
-        </p:nvPicPr>
-        <p:blipFill rotWithShape="1">
-          <a:blip r:embed="rId3">
-            <a:extLst>
-              <a:ext uri="{28A0092B-C50C-407E-A947-70E740481C1C}">
-                <a14:useLocalDpi xmlns:a14="http://schemas.microsoft.com/office/drawing/2010/main" val="0"/>
-              </a:ext>
-            </a:extLst>
-          </a:blip>
-          <a:srcRect l="19356" t="1825" r="6429" b="19357"/>
-          <a:stretch/>
-        </p:blipFill>
-        <p:spPr bwMode="auto">
-          <a:xfrm>
-            <a:off x="1559497" y="2708921"/>
-            <a:ext cx="9046007" cy="3618403"/>
-          </a:xfrm>
-          <a:prstGeom prst="rect">
-            <a:avLst/>
-          </a:prstGeom>
-          <a:noFill/>
-          <a:ln>
-            <a:noFill/>
-          </a:ln>
-          <a:effectLst/>
-          <a:extLst>
-            <a:ext uri="{909E8E84-426E-40DD-AFC4-6F175D3DCCD1}">
-              <a14:hiddenFill xmlns:a14="http://schemas.microsoft.com/office/drawing/2010/main">
-                <a:solidFill>
-                  <a:schemeClr val="accent1"/>
-                </a:solidFill>
-              </a14:hiddenFill>
-            </a:ext>
-            <a:ext uri="{91240B29-F687-4F45-9708-019B960494DF}">
-              <a14:hiddenLine xmlns:a14="http://schemas.microsoft.com/office/drawing/2010/main" w="9525">
-                <a:solidFill>
-                  <a:schemeClr val="tx1"/>
-                </a:solidFill>
-                <a:miter lim="800000"/>
-                <a:headEnd/>
-                <a:tailEnd/>
-              </a14:hiddenLine>
-            </a:ext>
-            <a:ext uri="{AF507438-7753-43E0-B8FC-AC1667EBCBE1}">
-              <a14:hiddenEffects xmlns:a14="http://schemas.microsoft.com/office/drawing/2010/main">
-                <a:effectLst>
-                  <a:outerShdw dist="35921" dir="2700000" algn="ctr" rotWithShape="0">
-                    <a:schemeClr val="bg2"/>
-                  </a:outerShdw>
-                </a:effectLst>
-              </a14:hiddenEffects>
-            </a:ext>
-          </a:extLst>
-        </p:spPr>
-      </p:pic>
-    </p:spTree>
-    <p:extLst>
-      <p:ext uri="{BB962C8B-B14F-4D97-AF65-F5344CB8AC3E}">
-        <p14:creationId xmlns:p14="http://schemas.microsoft.com/office/powerpoint/2010/main" val="1905099678"/>
-      </p:ext>
-    </p:extLst>
-  </p:cSld>
-  <p:clrMapOvr>
-    <a:masterClrMapping/>
-  </p:clrMapOvr>
-  <mc:AlternateContent xmlns:mc="http://schemas.openxmlformats.org/markup-compatibility/2006" xmlns:p14="http://schemas.microsoft.com/office/powerpoint/2010/main">
-    <mc:Choice Requires="p14">
-      <p:transition spd="slow" p14:dur="800">
-        <p14:flythrough/>
-      </p:transition>
-    </mc:Choice>
-    <mc:Fallback xmlns="">
-      <p:transition spd="slow">
-        <p:fade/>
-      </p:transition>
-    </mc:Fallback>
-  </mc:AlternateContent>
-</p:sld>
-</file>
-
-<file path=ppt/slides/slide13.xml><?xml version="1.0" encoding="utf-8"?>
-<p:sld xmlns:a="http://schemas.openxmlformats.org/drawingml/2006/main" xmlns:r="http://schemas.openxmlformats.org/officeDocument/2006/relationships" xmlns:p="http://schemas.openxmlformats.org/presentationml/2006/main">
-  <p:cSld>
-    <p:spTree>
-      <p:nvGrpSpPr>
-        <p:cNvPr id="1" name=""/>
-        <p:cNvGrpSpPr/>
-        <p:nvPr/>
-      </p:nvGrpSpPr>
-      <p:grpSpPr>
-        <a:xfrm>
-          <a:off x="0" y="0"/>
-          <a:ext cx="0" cy="0"/>
-          <a:chOff x="0" y="0"/>
-          <a:chExt cx="0" cy="0"/>
-        </a:xfrm>
-      </p:grpSpPr>
-      <p:pic>
-        <p:nvPicPr>
-          <p:cNvPr id="7" name="Picture 6"/>
-          <p:cNvPicPr>
-            <a:picLocks noChangeAspect="1"/>
-          </p:cNvPicPr>
-          <p:nvPr/>
-        </p:nvPicPr>
-        <p:blipFill>
-          <a:blip r:embed="rId2">
-            <a:extLst>
-              <a:ext uri="{28A0092B-C50C-407E-A947-70E740481C1C}">
-                <a14:useLocalDpi xmlns:a14="http://schemas.microsoft.com/office/drawing/2010/main" val="0"/>
-              </a:ext>
-            </a:extLst>
-          </a:blip>
-          <a:stretch>
-            <a:fillRect/>
-          </a:stretch>
-        </p:blipFill>
-        <p:spPr>
-          <a:xfrm>
-            <a:off x="1448972" y="1221310"/>
-            <a:ext cx="9214338" cy="3464591"/>
-          </a:xfrm>
-          <a:prstGeom prst="rect">
-            <a:avLst/>
-          </a:prstGeom>
-        </p:spPr>
-      </p:pic>
-    </p:spTree>
-    <p:extLst>
-      <p:ext uri="{BB962C8B-B14F-4D97-AF65-F5344CB8AC3E}">
-        <p14:creationId xmlns:p14="http://schemas.microsoft.com/office/powerpoint/2010/main" val="1101173295"/>
-      </p:ext>
-    </p:extLst>
-  </p:cSld>
-  <p:clrMapOvr>
-    <a:masterClrMapping/>
-  </p:clrMapOvr>
-  <mc:AlternateContent xmlns:mc="http://schemas.openxmlformats.org/markup-compatibility/2006" xmlns:p14="http://schemas.microsoft.com/office/powerpoint/2010/main">
-    <mc:Choice Requires="p14">
-      <p:transition spd="slow" p14:dur="800">
-        <p14:flythrough/>
-      </p:transition>
-    </mc:Choice>
-    <mc:Fallback xmlns="">
-      <p:transition spd="slow">
-        <p:fade/>
-      </p:transition>
-    </mc:Fallback>
-  </mc:AlternateContent>
-</p:sld>
-</file>
-
-<file path=ppt/slides/slide2.xml><?xml version="1.0" encoding="utf-8"?>
-<p:sld xmlns:a="http://schemas.openxmlformats.org/drawingml/2006/main" xmlns:r="http://schemas.openxmlformats.org/officeDocument/2006/relationships" xmlns:p="http://schemas.openxmlformats.org/presentationml/2006/main">
-  <p:cSld>
-    <p:spTree>
-      <p:nvGrpSpPr>
-        <p:cNvPr id="1" name=""/>
-        <p:cNvGrpSpPr/>
-        <p:nvPr/>
-      </p:nvGrpSpPr>
-      <p:grpSpPr>
-        <a:xfrm>
-          <a:off x="0" y="0"/>
-          <a:ext cx="0" cy="0"/>
-          <a:chOff x="0" y="0"/>
-          <a:chExt cx="0" cy="0"/>
-        </a:xfrm>
-      </p:grpSpPr>
-      <p:pic>
-        <p:nvPicPr>
-          <p:cNvPr id="5" name="Picture 4" descr="A picture containing sky&#10;&#10;Description generated with very high confidence"/>
-          <p:cNvPicPr>
-            <a:picLocks noChangeAspect="1"/>
-          </p:cNvPicPr>
-          <p:nvPr/>
-        </p:nvPicPr>
-        <p:blipFill>
-          <a:blip r:embed="rId2">
-            <a:extLst>
-              <a:ext uri="{28A0092B-C50C-407E-A947-70E740481C1C}">
-                <a14:useLocalDpi xmlns:a14="http://schemas.microsoft.com/office/drawing/2010/main" val="0"/>
-              </a:ext>
-            </a:extLst>
-          </a:blip>
-          <a:stretch>
-            <a:fillRect/>
-          </a:stretch>
-        </p:blipFill>
-        <p:spPr>
-          <a:xfrm>
-            <a:off x="0" y="0"/>
-            <a:ext cx="12192000" cy="6850035"/>
-          </a:xfrm>
-          <a:prstGeom prst="rect">
-            <a:avLst/>
-          </a:prstGeom>
-        </p:spPr>
-      </p:pic>
-    </p:spTree>
-    <p:extLst>
-      <p:ext uri="{BB962C8B-B14F-4D97-AF65-F5344CB8AC3E}">
-        <p14:creationId xmlns:p14="http://schemas.microsoft.com/office/powerpoint/2010/main" val="3995299784"/>
-      </p:ext>
-    </p:extLst>
-  </p:cSld>
-  <p:clrMapOvr>
-    <a:masterClrMapping/>
-  </p:clrMapOvr>
-  <mc:AlternateContent xmlns:mc="http://schemas.openxmlformats.org/markup-compatibility/2006" xmlns:p14="http://schemas.microsoft.com/office/powerpoint/2010/main">
-    <mc:Choice Requires="p14">
-      <p:transition spd="slow" p14:dur="800">
-        <p14:flythrough/>
-      </p:transition>
-    </mc:Choice>
-    <mc:Fallback xmlns="">
-      <p:transition spd="slow">
-        <p:fade/>
-      </p:transition>
-    </mc:Fallback>
-  </mc:AlternateContent>
-</p:sld>
-</file>
-
-<file path=ppt/slides/slide3.xml><?xml version="1.0" encoding="utf-8"?>
-<p:sld xmlns:a="http://schemas.openxmlformats.org/drawingml/2006/main" xmlns:r="http://schemas.openxmlformats.org/officeDocument/2006/relationships" xmlns:p="http://schemas.openxmlformats.org/presentationml/2006/main">
-  <p:cSld>
-    <p:spTree>
-      <p:nvGrpSpPr>
-        <p:cNvPr id="1" name=""/>
-        <p:cNvGrpSpPr/>
-        <p:nvPr/>
-      </p:nvGrpSpPr>
-      <p:grpSpPr>
-        <a:xfrm>
-          <a:off x="0" y="0"/>
-          <a:ext cx="0" cy="0"/>
-          <a:chOff x="0" y="0"/>
-          <a:chExt cx="0" cy="0"/>
-        </a:xfrm>
-      </p:grpSpPr>
-      <p:sp>
-        <p:nvSpPr>
-          <p:cNvPr id="2" name="Content Placeholder 1"/>
-          <p:cNvSpPr>
-            <a:spLocks noGrp="1"/>
-          </p:cNvSpPr>
-          <p:nvPr>
-            <p:ph idx="1"/>
-          </p:nvPr>
-        </p:nvSpPr>
-        <p:spPr>
-          <a:xfrm>
-            <a:off x="2828639" y="3104964"/>
-            <a:ext cx="6534725" cy="2588022"/>
-          </a:xfrm>
-        </p:spPr>
-        <p:txBody>
-          <a:bodyPr>
-            <a:normAutofit/>
-          </a:bodyPr>
-          <a:lstStyle/>
-          <a:p>
-            <a:pPr marL="0" indent="0" algn="ctr">
-              <a:buNone/>
-            </a:pPr>
-            <a:r>
-              <a:rPr lang="en-IN" sz="3600" dirty="0">
-                <a:latin typeface="Times New Roman" panose="02020603050405020304" pitchFamily="18" charset="0"/>
-                <a:cs typeface="Times New Roman" panose="02020603050405020304" pitchFamily="18" charset="0"/>
-              </a:rPr>
-              <a:t>Cloud Computing is the delivery of services such as storage, computation, networking etc to the customer on demand</a:t>
-            </a:r>
-          </a:p>
-        </p:txBody>
-      </p:sp>
-      <p:sp>
-        <p:nvSpPr>
-          <p:cNvPr id="3" name="Title 2"/>
-          <p:cNvSpPr>
-            <a:spLocks noGrp="1"/>
-          </p:cNvSpPr>
-          <p:nvPr>
-            <p:ph type="title"/>
-          </p:nvPr>
-        </p:nvSpPr>
-        <p:spPr/>
-        <p:txBody>
-          <a:bodyPr>
-            <a:normAutofit/>
-          </a:bodyPr>
-          <a:lstStyle/>
-          <a:p>
-            <a:r>
-              <a:rPr lang="en-IN" sz="4400" b="1" dirty="0">
-                <a:latin typeface="Times New Roman" panose="02020603050405020304" pitchFamily="18" charset="0"/>
-                <a:cs typeface="Times New Roman" panose="02020603050405020304" pitchFamily="18" charset="0"/>
-              </a:rPr>
-              <a:t>What is Cloud Computing</a:t>
-            </a:r>
-          </a:p>
-        </p:txBody>
-      </p:sp>
-    </p:spTree>
-    <p:extLst>
-      <p:ext uri="{BB962C8B-B14F-4D97-AF65-F5344CB8AC3E}">
-        <p14:creationId xmlns:p14="http://schemas.microsoft.com/office/powerpoint/2010/main" val="1815045627"/>
-      </p:ext>
-    </p:extLst>
-  </p:cSld>
-  <p:clrMapOvr>
-    <a:masterClrMapping/>
-  </p:clrMapOvr>
-  <mc:AlternateContent xmlns:mc="http://schemas.openxmlformats.org/markup-compatibility/2006" xmlns:p14="http://schemas.microsoft.com/office/powerpoint/2010/main">
-    <mc:Choice Requires="p14">
-      <p:transition spd="slow" p14:dur="800">
-        <p14:flythrough/>
-      </p:transition>
-    </mc:Choice>
-    <mc:Fallback xmlns="">
-      <p:transition spd="slow">
-        <p:fade/>
-      </p:transition>
-    </mc:Fallback>
-  </mc:AlternateContent>
-</p:sld>
-</file>
-
-<file path=ppt/slides/slide4.xml><?xml version="1.0" encoding="utf-8"?>
-<p:sld xmlns:a="http://schemas.openxmlformats.org/drawingml/2006/main" xmlns:r="http://schemas.openxmlformats.org/officeDocument/2006/relationships" xmlns:p="http://schemas.openxmlformats.org/presentationml/2006/main">
-  <p:cSld>
-    <p:spTree>
-      <p:nvGrpSpPr>
-        <p:cNvPr id="1" name=""/>
-        <p:cNvGrpSpPr/>
-        <p:nvPr/>
-      </p:nvGrpSpPr>
-      <p:grpSpPr>
-        <a:xfrm>
-          <a:off x="0" y="0"/>
-          <a:ext cx="0" cy="0"/>
-          <a:chOff x="0" y="0"/>
-          <a:chExt cx="0" cy="0"/>
-        </a:xfrm>
-      </p:grpSpPr>
-      <p:sp>
-        <p:nvSpPr>
-          <p:cNvPr id="2" name="Content Placeholder 1">
-            <a:extLst>
-              <a:ext uri="{FF2B5EF4-FFF2-40B4-BE49-F238E27FC236}">
-                <a16:creationId xmlns:a16="http://schemas.microsoft.com/office/drawing/2014/main" id="{C81A2BB4-E7FF-4C48-8916-9403A788C811}"/>
-              </a:ext>
-            </a:extLst>
-          </p:cNvPr>
-          <p:cNvSpPr>
-            <a:spLocks noGrp="1"/>
-          </p:cNvSpPr>
-          <p:nvPr>
-            <p:ph idx="1"/>
-          </p:nvPr>
-        </p:nvSpPr>
-        <p:spPr>
-          <a:xfrm>
-            <a:off x="2396069" y="2348881"/>
-            <a:ext cx="7408333" cy="4170791"/>
-          </a:xfrm>
-        </p:spPr>
-        <p:txBody>
-          <a:bodyPr>
-            <a:normAutofit/>
-          </a:bodyPr>
-          <a:lstStyle/>
-          <a:p>
-            <a:r>
-              <a:rPr lang="en-US" sz="3600" dirty="0"/>
-              <a:t>Scalability</a:t>
-            </a:r>
-          </a:p>
-          <a:p>
-            <a:r>
-              <a:rPr lang="en-US" sz="3600" dirty="0"/>
-              <a:t>Elasticity</a:t>
-            </a:r>
-          </a:p>
-          <a:p>
-            <a:r>
-              <a:rPr lang="en-US" sz="3600" dirty="0"/>
-              <a:t>Resource Pooling</a:t>
-            </a:r>
-          </a:p>
-          <a:p>
-            <a:r>
-              <a:rPr lang="en-US" sz="3600" dirty="0"/>
-              <a:t>Self Service</a:t>
-            </a:r>
-          </a:p>
-          <a:p>
-            <a:r>
-              <a:rPr lang="en-US" sz="3600" dirty="0"/>
-              <a:t>Low Cost</a:t>
-            </a:r>
-          </a:p>
-          <a:p>
-            <a:r>
-              <a:rPr lang="en-US" sz="3600" dirty="0"/>
-              <a:t>Fault Tolerance</a:t>
-            </a:r>
-          </a:p>
-        </p:txBody>
-      </p:sp>
-      <p:sp>
-        <p:nvSpPr>
-          <p:cNvPr id="3" name="Title 2">
-            <a:extLst>
-              <a:ext uri="{FF2B5EF4-FFF2-40B4-BE49-F238E27FC236}">
-                <a16:creationId xmlns:a16="http://schemas.microsoft.com/office/drawing/2014/main" id="{F825D5F7-0A2A-4E0E-911D-FAC4EA194E81}"/>
-              </a:ext>
-            </a:extLst>
-          </p:cNvPr>
-          <p:cNvSpPr>
-            <a:spLocks noGrp="1"/>
-          </p:cNvSpPr>
-          <p:nvPr>
-            <p:ph type="title"/>
-          </p:nvPr>
-        </p:nvSpPr>
-        <p:spPr/>
-        <p:txBody>
-          <a:bodyPr>
-            <a:normAutofit/>
-          </a:bodyPr>
-          <a:lstStyle/>
-          <a:p>
-            <a:r>
-              <a:rPr lang="en-US" sz="5400" b="1" dirty="0"/>
-              <a:t>Features</a:t>
-            </a:r>
-          </a:p>
-        </p:txBody>
-      </p:sp>
-    </p:spTree>
-    <p:extLst>
-      <p:ext uri="{BB962C8B-B14F-4D97-AF65-F5344CB8AC3E}">
-        <p14:creationId xmlns:p14="http://schemas.microsoft.com/office/powerpoint/2010/main" val="2575274937"/>
-      </p:ext>
-    </p:extLst>
-  </p:cSld>
-  <p:clrMapOvr>
-    <a:masterClrMapping/>
-  </p:clrMapOvr>
-  <mc:AlternateContent xmlns:mc="http://schemas.openxmlformats.org/markup-compatibility/2006" xmlns:p14="http://schemas.microsoft.com/office/powerpoint/2010/main">
-    <mc:Choice Requires="p14">
-      <p:transition spd="slow" p14:dur="800">
-        <p14:flythrough/>
-      </p:transition>
-    </mc:Choice>
-    <mc:Fallback xmlns="">
-      <p:transition spd="slow">
-        <p:fade/>
-      </p:transition>
-    </mc:Fallback>
-  </mc:AlternateContent>
-</p:sld>
-</file>
-
-<file path=ppt/slides/slide5.xml><?xml version="1.0" encoding="utf-8"?>
-<p:sld xmlns:a="http://schemas.openxmlformats.org/drawingml/2006/main" xmlns:r="http://schemas.openxmlformats.org/officeDocument/2006/relationships" xmlns:p="http://schemas.openxmlformats.org/presentationml/2006/main">
-  <p:cSld>
-    <p:spTree>
-      <p:nvGrpSpPr>
-        <p:cNvPr id="1" name=""/>
-        <p:cNvGrpSpPr/>
-        <p:nvPr/>
-      </p:nvGrpSpPr>
-      <p:grpSpPr>
-        <a:xfrm>
-          <a:off x="0" y="0"/>
-          <a:ext cx="0" cy="0"/>
-          <a:chOff x="0" y="0"/>
-          <a:chExt cx="0" cy="0"/>
-        </a:xfrm>
-      </p:grpSpPr>
-      <p:sp>
-        <p:nvSpPr>
           <p:cNvPr id="2" name="Title 1"/>
           <p:cNvSpPr>
             <a:spLocks noGrp="1"/>
@@ -19475,7 +18701,7 @@
 </p:sld>
 </file>
 
-<file path=ppt/slides/slide6.xml><?xml version="1.0" encoding="utf-8"?>
+<file path=ppt/slides/slide11.xml><?xml version="1.0" encoding="utf-8"?>
 <p:sld xmlns:a="http://schemas.openxmlformats.org/drawingml/2006/main" xmlns:r="http://schemas.openxmlformats.org/officeDocument/2006/relationships" xmlns:p="http://schemas.openxmlformats.org/presentationml/2006/main">
   <p:cSld>
     <p:spTree>
@@ -19568,7 +18794,7 @@
 </p:sld>
 </file>
 
-<file path=ppt/slides/slide7.xml><?xml version="1.0" encoding="utf-8"?>
+<file path=ppt/slides/slide12.xml><?xml version="1.0" encoding="utf-8"?>
 <p:sld xmlns:a="http://schemas.openxmlformats.org/drawingml/2006/main" xmlns:r="http://schemas.openxmlformats.org/officeDocument/2006/relationships" xmlns:p="http://schemas.openxmlformats.org/presentationml/2006/main">
   <p:cSld>
     <p:spTree>
@@ -19661,7 +18887,7 @@
 </p:sld>
 </file>
 
-<file path=ppt/slides/slide8.xml><?xml version="1.0" encoding="utf-8"?>
+<file path=ppt/slides/slide13.xml><?xml version="1.0" encoding="utf-8"?>
 <p:sld xmlns:a="http://schemas.openxmlformats.org/drawingml/2006/main" xmlns:r="http://schemas.openxmlformats.org/officeDocument/2006/relationships" xmlns:p="http://schemas.openxmlformats.org/presentationml/2006/main">
   <p:cSld>
     <p:spTree>
@@ -19754,7 +18980,7 @@
 </p:sld>
 </file>
 
-<file path=ppt/slides/slide9.xml><?xml version="1.0" encoding="utf-8"?>
+<file path=ppt/slides/slide14.xml><?xml version="1.0" encoding="utf-8"?>
 <p:sld xmlns:a="http://schemas.openxmlformats.org/drawingml/2006/main" xmlns:r="http://schemas.openxmlformats.org/officeDocument/2006/relationships" xmlns:p="http://schemas.openxmlformats.org/presentationml/2006/main">
   <p:cSld>
     <p:spTree>
@@ -19942,6 +19168,1110 @@
       </p:par>
     </p:tnLst>
   </p:timing>
+</p:sld>
+</file>
+
+<file path=ppt/slides/slide15.xml><?xml version="1.0" encoding="utf-8"?>
+<p:sld xmlns:a="http://schemas.openxmlformats.org/drawingml/2006/main" xmlns:r="http://schemas.openxmlformats.org/officeDocument/2006/relationships" xmlns:p="http://schemas.openxmlformats.org/presentationml/2006/main">
+  <p:cSld>
+    <p:spTree>
+      <p:nvGrpSpPr>
+        <p:cNvPr id="1" name=""/>
+        <p:cNvGrpSpPr/>
+        <p:nvPr/>
+      </p:nvGrpSpPr>
+      <p:grpSpPr>
+        <a:xfrm>
+          <a:off x="0" y="0"/>
+          <a:ext cx="0" cy="0"/>
+          <a:chOff x="0" y="0"/>
+          <a:chExt cx="0" cy="0"/>
+        </a:xfrm>
+      </p:grpSpPr>
+      <p:sp>
+        <p:nvSpPr>
+          <p:cNvPr id="2" name="Content Placeholder 1"/>
+          <p:cNvSpPr>
+            <a:spLocks noGrp="1"/>
+          </p:cNvSpPr>
+          <p:nvPr>
+            <p:ph idx="1"/>
+          </p:nvPr>
+        </p:nvSpPr>
+        <p:spPr>
+          <a:xfrm>
+            <a:off x="2207568" y="2726922"/>
+            <a:ext cx="8208912" cy="3132348"/>
+          </a:xfrm>
+        </p:spPr>
+        <p:txBody>
+          <a:bodyPr>
+            <a:normAutofit/>
+          </a:bodyPr>
+          <a:lstStyle/>
+          <a:p>
+            <a:r>
+              <a:rPr lang="en-IN" sz="2400" dirty="0">
+                <a:latin typeface="Times New Roman" panose="02020603050405020304" pitchFamily="18" charset="0"/>
+                <a:cs typeface="Times New Roman" panose="02020603050405020304" pitchFamily="18" charset="0"/>
+              </a:rPr>
+              <a:t>Virtualization refers to partitioning one physical server into several virtual servers, or machines.</a:t>
+            </a:r>
+          </a:p>
+          <a:p>
+            <a:pPr marL="0" indent="0">
+              <a:buNone/>
+            </a:pPr>
+            <a:endParaRPr lang="en-IN" sz="2625" dirty="0">
+              <a:latin typeface="Times New Roman" panose="02020603050405020304" pitchFamily="18" charset="0"/>
+              <a:cs typeface="Times New Roman" panose="02020603050405020304" pitchFamily="18" charset="0"/>
+            </a:endParaRPr>
+          </a:p>
+          <a:p>
+            <a:r>
+              <a:rPr lang="en-IN" dirty="0">
+                <a:latin typeface="Times New Roman" panose="02020603050405020304" pitchFamily="18" charset="0"/>
+                <a:cs typeface="Times New Roman" panose="02020603050405020304" pitchFamily="18" charset="0"/>
+              </a:rPr>
+              <a:t> </a:t>
+            </a:r>
+            <a:r>
+              <a:rPr lang="en-IN" sz="2400" dirty="0">
+                <a:latin typeface="Times New Roman" panose="02020603050405020304" pitchFamily="18" charset="0"/>
+                <a:cs typeface="Times New Roman" panose="02020603050405020304" pitchFamily="18" charset="0"/>
+              </a:rPr>
+              <a:t>Each virtual machine can interact independently with other devices, applications, data and users as though it were a separate physical resource.</a:t>
+            </a:r>
+          </a:p>
+          <a:p>
+            <a:endParaRPr lang="en-IN" sz="2400" dirty="0">
+              <a:latin typeface="Times New Roman" panose="02020603050405020304" pitchFamily="18" charset="0"/>
+              <a:cs typeface="Times New Roman" panose="02020603050405020304" pitchFamily="18" charset="0"/>
+            </a:endParaRPr>
+          </a:p>
+        </p:txBody>
+      </p:sp>
+      <p:sp>
+        <p:nvSpPr>
+          <p:cNvPr id="3" name="Title 2"/>
+          <p:cNvSpPr>
+            <a:spLocks noGrp="1"/>
+          </p:cNvSpPr>
+          <p:nvPr>
+            <p:ph type="title"/>
+          </p:nvPr>
+        </p:nvSpPr>
+        <p:spPr/>
+        <p:txBody>
+          <a:bodyPr/>
+          <a:lstStyle/>
+          <a:p>
+            <a:r>
+              <a:rPr lang="en-IN" b="1" dirty="0">
+                <a:latin typeface="Times New Roman" panose="02020603050405020304" pitchFamily="18" charset="0"/>
+                <a:cs typeface="Times New Roman" panose="02020603050405020304" pitchFamily="18" charset="0"/>
+              </a:rPr>
+              <a:t>WHAT IS VIRTUALIZATION?</a:t>
+            </a:r>
+          </a:p>
+        </p:txBody>
+      </p:sp>
+    </p:spTree>
+    <p:extLst>
+      <p:ext uri="{BB962C8B-B14F-4D97-AF65-F5344CB8AC3E}">
+        <p14:creationId xmlns:p14="http://schemas.microsoft.com/office/powerpoint/2010/main" val="3086251152"/>
+      </p:ext>
+    </p:extLst>
+  </p:cSld>
+  <p:clrMapOvr>
+    <a:masterClrMapping/>
+  </p:clrMapOvr>
+  <mc:AlternateContent xmlns:mc="http://schemas.openxmlformats.org/markup-compatibility/2006" xmlns:p14="http://schemas.microsoft.com/office/powerpoint/2010/main">
+    <mc:Choice Requires="p14">
+      <p:transition spd="slow" p14:dur="800">
+        <p14:flythrough/>
+      </p:transition>
+    </mc:Choice>
+    <mc:Fallback xmlns="">
+      <p:transition spd="slow">
+        <p:fade/>
+      </p:transition>
+    </mc:Fallback>
+  </mc:AlternateContent>
+</p:sld>
+</file>
+
+<file path=ppt/slides/slide16.xml><?xml version="1.0" encoding="utf-8"?>
+<p:sld xmlns:a="http://schemas.openxmlformats.org/drawingml/2006/main" xmlns:r="http://schemas.openxmlformats.org/officeDocument/2006/relationships" xmlns:p="http://schemas.openxmlformats.org/presentationml/2006/main">
+  <p:cSld>
+    <p:spTree>
+      <p:nvGrpSpPr>
+        <p:cNvPr id="1" name=""/>
+        <p:cNvGrpSpPr/>
+        <p:nvPr/>
+      </p:nvGrpSpPr>
+      <p:grpSpPr>
+        <a:xfrm>
+          <a:off x="0" y="0"/>
+          <a:ext cx="0" cy="0"/>
+          <a:chOff x="0" y="0"/>
+          <a:chExt cx="0" cy="0"/>
+        </a:xfrm>
+      </p:grpSpPr>
+      <p:sp>
+        <p:nvSpPr>
+          <p:cNvPr id="3" name="Title 2"/>
+          <p:cNvSpPr>
+            <a:spLocks noGrp="1"/>
+          </p:cNvSpPr>
+          <p:nvPr>
+            <p:ph type="title"/>
+          </p:nvPr>
+        </p:nvSpPr>
+        <p:spPr/>
+        <p:txBody>
+          <a:bodyPr/>
+          <a:lstStyle/>
+          <a:p>
+            <a:r>
+              <a:rPr lang="en-IN" b="1" dirty="0">
+                <a:latin typeface="Times New Roman" panose="02020603050405020304" pitchFamily="18" charset="0"/>
+                <a:cs typeface="Times New Roman" panose="02020603050405020304" pitchFamily="18" charset="0"/>
+              </a:rPr>
+              <a:t>HYPERVISORS</a:t>
+            </a:r>
+          </a:p>
+        </p:txBody>
+      </p:sp>
+      <p:pic>
+        <p:nvPicPr>
+          <p:cNvPr id="2" name="Picture 1"/>
+          <p:cNvPicPr>
+            <a:picLocks noChangeAspect="1"/>
+          </p:cNvPicPr>
+          <p:nvPr/>
+        </p:nvPicPr>
+        <p:blipFill>
+          <a:blip r:embed="rId2">
+            <a:extLst>
+              <a:ext uri="{28A0092B-C50C-407E-A947-70E740481C1C}">
+                <a14:useLocalDpi xmlns:a14="http://schemas.microsoft.com/office/drawing/2010/main" val="0"/>
+              </a:ext>
+            </a:extLst>
+          </a:blip>
+          <a:stretch>
+            <a:fillRect/>
+          </a:stretch>
+        </p:blipFill>
+        <p:spPr>
+          <a:xfrm>
+            <a:off x="3359696" y="2420888"/>
+            <a:ext cx="6102678" cy="3810378"/>
+          </a:xfrm>
+          <a:prstGeom prst="rect">
+            <a:avLst/>
+          </a:prstGeom>
+        </p:spPr>
+      </p:pic>
+    </p:spTree>
+    <p:extLst>
+      <p:ext uri="{BB962C8B-B14F-4D97-AF65-F5344CB8AC3E}">
+        <p14:creationId xmlns:p14="http://schemas.microsoft.com/office/powerpoint/2010/main" val="4161623438"/>
+      </p:ext>
+    </p:extLst>
+  </p:cSld>
+  <p:clrMapOvr>
+    <a:masterClrMapping/>
+  </p:clrMapOvr>
+  <mc:AlternateContent xmlns:mc="http://schemas.openxmlformats.org/markup-compatibility/2006" xmlns:p14="http://schemas.microsoft.com/office/powerpoint/2010/main">
+    <mc:Choice Requires="p14">
+      <p:transition spd="slow" p14:dur="800">
+        <p14:flythrough/>
+      </p:transition>
+    </mc:Choice>
+    <mc:Fallback xmlns="">
+      <p:transition spd="slow">
+        <p:fade/>
+      </p:transition>
+    </mc:Fallback>
+  </mc:AlternateContent>
+</p:sld>
+</file>
+
+<file path=ppt/slides/slide17.xml><?xml version="1.0" encoding="utf-8"?>
+<p:sld xmlns:a="http://schemas.openxmlformats.org/drawingml/2006/main" xmlns:r="http://schemas.openxmlformats.org/officeDocument/2006/relationships" xmlns:p="http://schemas.openxmlformats.org/presentationml/2006/main">
+  <p:cSld>
+    <p:spTree>
+      <p:nvGrpSpPr>
+        <p:cNvPr id="1" name=""/>
+        <p:cNvGrpSpPr/>
+        <p:nvPr/>
+      </p:nvGrpSpPr>
+      <p:grpSpPr>
+        <a:xfrm>
+          <a:off x="0" y="0"/>
+          <a:ext cx="0" cy="0"/>
+          <a:chOff x="0" y="0"/>
+          <a:chExt cx="0" cy="0"/>
+        </a:xfrm>
+      </p:grpSpPr>
+      <p:sp>
+        <p:nvSpPr>
+          <p:cNvPr id="2" name="Content Placeholder 1"/>
+          <p:cNvSpPr>
+            <a:spLocks noGrp="1"/>
+          </p:cNvSpPr>
+          <p:nvPr>
+            <p:ph idx="1"/>
+          </p:nvPr>
+        </p:nvSpPr>
+        <p:spPr>
+          <a:xfrm>
+            <a:off x="1981200" y="1916832"/>
+            <a:ext cx="8435280" cy="4752528"/>
+          </a:xfrm>
+        </p:spPr>
+        <p:txBody>
+          <a:bodyPr/>
+          <a:lstStyle/>
+          <a:p>
+            <a:r>
+              <a:rPr lang="en-IN" b="1" dirty="0">
+                <a:latin typeface="Times New Roman" panose="02020603050405020304" pitchFamily="18" charset="0"/>
+                <a:cs typeface="Times New Roman" panose="02020603050405020304" pitchFamily="18" charset="0"/>
+              </a:rPr>
+              <a:t>Memory Isolation</a:t>
+            </a:r>
+          </a:p>
+          <a:p>
+            <a:endParaRPr lang="en-IN" b="1" dirty="0">
+              <a:latin typeface="Times New Roman" panose="02020603050405020304" pitchFamily="18" charset="0"/>
+              <a:cs typeface="Times New Roman" panose="02020603050405020304" pitchFamily="18" charset="0"/>
+            </a:endParaRPr>
+          </a:p>
+        </p:txBody>
+      </p:sp>
+      <p:sp>
+        <p:nvSpPr>
+          <p:cNvPr id="3" name="Title 2"/>
+          <p:cNvSpPr>
+            <a:spLocks noGrp="1"/>
+          </p:cNvSpPr>
+          <p:nvPr>
+            <p:ph type="title"/>
+          </p:nvPr>
+        </p:nvSpPr>
+        <p:spPr/>
+        <p:txBody>
+          <a:bodyPr>
+            <a:normAutofit/>
+          </a:bodyPr>
+          <a:lstStyle/>
+          <a:p>
+            <a:r>
+              <a:rPr lang="en-IN" b="1" dirty="0">
+                <a:latin typeface="Times New Roman" pitchFamily="18" charset="0"/>
+                <a:cs typeface="Times New Roman" pitchFamily="18" charset="0"/>
+              </a:rPr>
+              <a:t>VM ARCHITECTURE AND WORKING</a:t>
+            </a:r>
+          </a:p>
+        </p:txBody>
+      </p:sp>
+      <p:pic>
+        <p:nvPicPr>
+          <p:cNvPr id="2050" name="Picture 2"/>
+          <p:cNvPicPr>
+            <a:picLocks noChangeAspect="1" noChangeArrowheads="1"/>
+          </p:cNvPicPr>
+          <p:nvPr/>
+        </p:nvPicPr>
+        <p:blipFill rotWithShape="1">
+          <a:blip r:embed="rId3">
+            <a:extLst>
+              <a:ext uri="{28A0092B-C50C-407E-A947-70E740481C1C}">
+                <a14:useLocalDpi xmlns:a14="http://schemas.microsoft.com/office/drawing/2010/main" val="0"/>
+              </a:ext>
+            </a:extLst>
+          </a:blip>
+          <a:srcRect l="19356" t="1825" r="6429" b="19357"/>
+          <a:stretch/>
+        </p:blipFill>
+        <p:spPr bwMode="auto">
+          <a:xfrm>
+            <a:off x="1559497" y="2708921"/>
+            <a:ext cx="9046007" cy="3618403"/>
+          </a:xfrm>
+          <a:prstGeom prst="rect">
+            <a:avLst/>
+          </a:prstGeom>
+          <a:noFill/>
+          <a:ln>
+            <a:noFill/>
+          </a:ln>
+          <a:effectLst/>
+          <a:extLst>
+            <a:ext uri="{909E8E84-426E-40DD-AFC4-6F175D3DCCD1}">
+              <a14:hiddenFill xmlns:a14="http://schemas.microsoft.com/office/drawing/2010/main">
+                <a:solidFill>
+                  <a:schemeClr val="accent1"/>
+                </a:solidFill>
+              </a14:hiddenFill>
+            </a:ext>
+            <a:ext uri="{91240B29-F687-4F45-9708-019B960494DF}">
+              <a14:hiddenLine xmlns:a14="http://schemas.microsoft.com/office/drawing/2010/main" w="9525">
+                <a:solidFill>
+                  <a:schemeClr val="tx1"/>
+                </a:solidFill>
+                <a:miter lim="800000"/>
+                <a:headEnd/>
+                <a:tailEnd/>
+              </a14:hiddenLine>
+            </a:ext>
+            <a:ext uri="{AF507438-7753-43E0-B8FC-AC1667EBCBE1}">
+              <a14:hiddenEffects xmlns:a14="http://schemas.microsoft.com/office/drawing/2010/main">
+                <a:effectLst>
+                  <a:outerShdw dist="35921" dir="2700000" algn="ctr" rotWithShape="0">
+                    <a:schemeClr val="bg2"/>
+                  </a:outerShdw>
+                </a:effectLst>
+              </a14:hiddenEffects>
+            </a:ext>
+          </a:extLst>
+        </p:spPr>
+      </p:pic>
+    </p:spTree>
+    <p:extLst>
+      <p:ext uri="{BB962C8B-B14F-4D97-AF65-F5344CB8AC3E}">
+        <p14:creationId xmlns:p14="http://schemas.microsoft.com/office/powerpoint/2010/main" val="1905099678"/>
+      </p:ext>
+    </p:extLst>
+  </p:cSld>
+  <p:clrMapOvr>
+    <a:masterClrMapping/>
+  </p:clrMapOvr>
+  <mc:AlternateContent xmlns:mc="http://schemas.openxmlformats.org/markup-compatibility/2006" xmlns:p14="http://schemas.microsoft.com/office/powerpoint/2010/main">
+    <mc:Choice Requires="p14">
+      <p:transition spd="slow" p14:dur="800">
+        <p14:flythrough/>
+      </p:transition>
+    </mc:Choice>
+    <mc:Fallback xmlns="">
+      <p:transition spd="slow">
+        <p:fade/>
+      </p:transition>
+    </mc:Fallback>
+  </mc:AlternateContent>
+</p:sld>
+</file>
+
+<file path=ppt/slides/slide18.xml><?xml version="1.0" encoding="utf-8"?>
+<p:sld xmlns:a="http://schemas.openxmlformats.org/drawingml/2006/main" xmlns:r="http://schemas.openxmlformats.org/officeDocument/2006/relationships" xmlns:p="http://schemas.openxmlformats.org/presentationml/2006/main">
+  <p:cSld>
+    <p:spTree>
+      <p:nvGrpSpPr>
+        <p:cNvPr id="1" name=""/>
+        <p:cNvGrpSpPr/>
+        <p:nvPr/>
+      </p:nvGrpSpPr>
+      <p:grpSpPr>
+        <a:xfrm>
+          <a:off x="0" y="0"/>
+          <a:ext cx="0" cy="0"/>
+          <a:chOff x="0" y="0"/>
+          <a:chExt cx="0" cy="0"/>
+        </a:xfrm>
+      </p:grpSpPr>
+      <p:pic>
+        <p:nvPicPr>
+          <p:cNvPr id="7" name="Picture 6"/>
+          <p:cNvPicPr>
+            <a:picLocks noChangeAspect="1"/>
+          </p:cNvPicPr>
+          <p:nvPr/>
+        </p:nvPicPr>
+        <p:blipFill>
+          <a:blip r:embed="rId2">
+            <a:extLst>
+              <a:ext uri="{28A0092B-C50C-407E-A947-70E740481C1C}">
+                <a14:useLocalDpi xmlns:a14="http://schemas.microsoft.com/office/drawing/2010/main" val="0"/>
+              </a:ext>
+            </a:extLst>
+          </a:blip>
+          <a:stretch>
+            <a:fillRect/>
+          </a:stretch>
+        </p:blipFill>
+        <p:spPr>
+          <a:xfrm>
+            <a:off x="1448972" y="1221310"/>
+            <a:ext cx="9214338" cy="3464591"/>
+          </a:xfrm>
+          <a:prstGeom prst="rect">
+            <a:avLst/>
+          </a:prstGeom>
+        </p:spPr>
+      </p:pic>
+    </p:spTree>
+    <p:extLst>
+      <p:ext uri="{BB962C8B-B14F-4D97-AF65-F5344CB8AC3E}">
+        <p14:creationId xmlns:p14="http://schemas.microsoft.com/office/powerpoint/2010/main" val="1101173295"/>
+      </p:ext>
+    </p:extLst>
+  </p:cSld>
+  <p:clrMapOvr>
+    <a:masterClrMapping/>
+  </p:clrMapOvr>
+  <mc:AlternateContent xmlns:mc="http://schemas.openxmlformats.org/markup-compatibility/2006" xmlns:p14="http://schemas.microsoft.com/office/powerpoint/2010/main">
+    <mc:Choice Requires="p14">
+      <p:transition spd="slow" p14:dur="800">
+        <p14:flythrough/>
+      </p:transition>
+    </mc:Choice>
+    <mc:Fallback xmlns="">
+      <p:transition spd="slow">
+        <p:fade/>
+      </p:transition>
+    </mc:Fallback>
+  </mc:AlternateContent>
+</p:sld>
+</file>
+
+<file path=ppt/slides/slide2.xml><?xml version="1.0" encoding="utf-8"?>
+<p:sld xmlns:a="http://schemas.openxmlformats.org/drawingml/2006/main" xmlns:r="http://schemas.openxmlformats.org/officeDocument/2006/relationships" xmlns:p="http://schemas.openxmlformats.org/presentationml/2006/main">
+  <p:cSld>
+    <p:spTree>
+      <p:nvGrpSpPr>
+        <p:cNvPr id="1" name=""/>
+        <p:cNvGrpSpPr/>
+        <p:nvPr/>
+      </p:nvGrpSpPr>
+      <p:grpSpPr>
+        <a:xfrm>
+          <a:off x="0" y="0"/>
+          <a:ext cx="0" cy="0"/>
+          <a:chOff x="0" y="0"/>
+          <a:chExt cx="0" cy="0"/>
+        </a:xfrm>
+      </p:grpSpPr>
+      <p:pic>
+        <p:nvPicPr>
+          <p:cNvPr id="5" name="Content Placeholder 4" descr="A picture containing object&#10;&#10;Description automatically generated">
+            <a:extLst>
+              <a:ext uri="{FF2B5EF4-FFF2-40B4-BE49-F238E27FC236}">
+                <a16:creationId xmlns:a16="http://schemas.microsoft.com/office/drawing/2014/main" id="{FCB01F79-9D56-4334-BD05-A98D3540DBFE}"/>
+              </a:ext>
+            </a:extLst>
+          </p:cNvPr>
+          <p:cNvPicPr>
+            <a:picLocks noGrp="1" noChangeAspect="1"/>
+          </p:cNvPicPr>
+          <p:nvPr>
+            <p:ph idx="1"/>
+          </p:nvPr>
+        </p:nvPicPr>
+        <p:blipFill>
+          <a:blip r:embed="rId2">
+            <a:extLst>
+              <a:ext uri="{28A0092B-C50C-407E-A947-70E740481C1C}">
+                <a14:useLocalDpi xmlns:a14="http://schemas.microsoft.com/office/drawing/2010/main" val="0"/>
+              </a:ext>
+            </a:extLst>
+          </a:blip>
+          <a:stretch>
+            <a:fillRect/>
+          </a:stretch>
+        </p:blipFill>
+        <p:spPr>
+          <a:xfrm>
+            <a:off x="4068417" y="99561"/>
+            <a:ext cx="3538330" cy="6658878"/>
+          </a:xfrm>
+        </p:spPr>
+      </p:pic>
+    </p:spTree>
+    <p:extLst>
+      <p:ext uri="{BB962C8B-B14F-4D97-AF65-F5344CB8AC3E}">
+        <p14:creationId xmlns:p14="http://schemas.microsoft.com/office/powerpoint/2010/main" val="3364765020"/>
+      </p:ext>
+    </p:extLst>
+  </p:cSld>
+  <p:clrMapOvr>
+    <a:masterClrMapping/>
+  </p:clrMapOvr>
+</p:sld>
+</file>
+
+<file path=ppt/slides/slide3.xml><?xml version="1.0" encoding="utf-8"?>
+<p:sld xmlns:a="http://schemas.openxmlformats.org/drawingml/2006/main" xmlns:r="http://schemas.openxmlformats.org/officeDocument/2006/relationships" xmlns:p="http://schemas.openxmlformats.org/presentationml/2006/main">
+  <p:cSld>
+    <p:spTree>
+      <p:nvGrpSpPr>
+        <p:cNvPr id="1" name=""/>
+        <p:cNvGrpSpPr/>
+        <p:nvPr/>
+      </p:nvGrpSpPr>
+      <p:grpSpPr>
+        <a:xfrm>
+          <a:off x="0" y="0"/>
+          <a:ext cx="0" cy="0"/>
+          <a:chOff x="0" y="0"/>
+          <a:chExt cx="0" cy="0"/>
+        </a:xfrm>
+      </p:grpSpPr>
+      <p:pic>
+        <p:nvPicPr>
+          <p:cNvPr id="5" name="Content Placeholder 4" descr="A screenshot of a cell phone&#10;&#10;Description automatically generated">
+            <a:extLst>
+              <a:ext uri="{FF2B5EF4-FFF2-40B4-BE49-F238E27FC236}">
+                <a16:creationId xmlns:a16="http://schemas.microsoft.com/office/drawing/2014/main" id="{368C71FE-DDD6-4EEC-AFE3-F386F4C78749}"/>
+              </a:ext>
+            </a:extLst>
+          </p:cNvPr>
+          <p:cNvPicPr>
+            <a:picLocks noGrp="1" noChangeAspect="1"/>
+          </p:cNvPicPr>
+          <p:nvPr>
+            <p:ph idx="1"/>
+          </p:nvPr>
+        </p:nvPicPr>
+        <p:blipFill>
+          <a:blip r:embed="rId2">
+            <a:extLst>
+              <a:ext uri="{28A0092B-C50C-407E-A947-70E740481C1C}">
+                <a14:useLocalDpi xmlns:a14="http://schemas.microsoft.com/office/drawing/2010/main" val="0"/>
+              </a:ext>
+            </a:extLst>
+          </a:blip>
+          <a:stretch>
+            <a:fillRect/>
+          </a:stretch>
+        </p:blipFill>
+        <p:spPr>
+          <a:xfrm>
+            <a:off x="378142" y="1706880"/>
+            <a:ext cx="11513275" cy="3296047"/>
+          </a:xfrm>
+        </p:spPr>
+      </p:pic>
+    </p:spTree>
+    <p:extLst>
+      <p:ext uri="{BB962C8B-B14F-4D97-AF65-F5344CB8AC3E}">
+        <p14:creationId xmlns:p14="http://schemas.microsoft.com/office/powerpoint/2010/main" val="554913080"/>
+      </p:ext>
+    </p:extLst>
+  </p:cSld>
+  <p:clrMapOvr>
+    <a:masterClrMapping/>
+  </p:clrMapOvr>
+</p:sld>
+</file>
+
+<file path=ppt/slides/slide4.xml><?xml version="1.0" encoding="utf-8"?>
+<p:sld xmlns:a="http://schemas.openxmlformats.org/drawingml/2006/main" xmlns:r="http://schemas.openxmlformats.org/officeDocument/2006/relationships" xmlns:p="http://schemas.openxmlformats.org/presentationml/2006/main">
+  <p:cSld>
+    <p:spTree>
+      <p:nvGrpSpPr>
+        <p:cNvPr id="1" name=""/>
+        <p:cNvGrpSpPr/>
+        <p:nvPr/>
+      </p:nvGrpSpPr>
+      <p:grpSpPr>
+        <a:xfrm>
+          <a:off x="0" y="0"/>
+          <a:ext cx="0" cy="0"/>
+          <a:chOff x="0" y="0"/>
+          <a:chExt cx="0" cy="0"/>
+        </a:xfrm>
+      </p:grpSpPr>
+      <p:pic>
+        <p:nvPicPr>
+          <p:cNvPr id="5" name="Content Placeholder 4" descr="A screenshot of a cell phone&#10;&#10;Description automatically generated">
+            <a:extLst>
+              <a:ext uri="{FF2B5EF4-FFF2-40B4-BE49-F238E27FC236}">
+                <a16:creationId xmlns:a16="http://schemas.microsoft.com/office/drawing/2014/main" id="{CD4B3F0D-5D4B-4472-8CAC-339487323D4D}"/>
+              </a:ext>
+            </a:extLst>
+          </p:cNvPr>
+          <p:cNvPicPr>
+            <a:picLocks noGrp="1" noChangeAspect="1"/>
+          </p:cNvPicPr>
+          <p:nvPr>
+            <p:ph idx="1"/>
+          </p:nvPr>
+        </p:nvPicPr>
+        <p:blipFill>
+          <a:blip r:embed="rId2">
+            <a:extLst>
+              <a:ext uri="{28A0092B-C50C-407E-A947-70E740481C1C}">
+                <a14:useLocalDpi xmlns:a14="http://schemas.microsoft.com/office/drawing/2010/main" val="0"/>
+              </a:ext>
+            </a:extLst>
+          </a:blip>
+          <a:stretch>
+            <a:fillRect/>
+          </a:stretch>
+        </p:blipFill>
+        <p:spPr>
+          <a:xfrm>
+            <a:off x="110067" y="335280"/>
+            <a:ext cx="11971865" cy="6187439"/>
+          </a:xfrm>
+        </p:spPr>
+      </p:pic>
+    </p:spTree>
+    <p:extLst>
+      <p:ext uri="{BB962C8B-B14F-4D97-AF65-F5344CB8AC3E}">
+        <p14:creationId xmlns:p14="http://schemas.microsoft.com/office/powerpoint/2010/main" val="3919744525"/>
+      </p:ext>
+    </p:extLst>
+  </p:cSld>
+  <p:clrMapOvr>
+    <a:masterClrMapping/>
+  </p:clrMapOvr>
+</p:sld>
+</file>
+
+<file path=ppt/slides/slide5.xml><?xml version="1.0" encoding="utf-8"?>
+<p:sld xmlns:a="http://schemas.openxmlformats.org/drawingml/2006/main" xmlns:r="http://schemas.openxmlformats.org/officeDocument/2006/relationships" xmlns:p="http://schemas.openxmlformats.org/presentationml/2006/main">
+  <p:cSld>
+    <p:spTree>
+      <p:nvGrpSpPr>
+        <p:cNvPr id="1" name=""/>
+        <p:cNvGrpSpPr/>
+        <p:nvPr/>
+      </p:nvGrpSpPr>
+      <p:grpSpPr>
+        <a:xfrm>
+          <a:off x="0" y="0"/>
+          <a:ext cx="0" cy="0"/>
+          <a:chOff x="0" y="0"/>
+          <a:chExt cx="0" cy="0"/>
+        </a:xfrm>
+      </p:grpSpPr>
+      <p:pic>
+        <p:nvPicPr>
+          <p:cNvPr id="5" name="Content Placeholder 4" descr="A screenshot of a social media post&#10;&#10;Description automatically generated">
+            <a:extLst>
+              <a:ext uri="{FF2B5EF4-FFF2-40B4-BE49-F238E27FC236}">
+                <a16:creationId xmlns:a16="http://schemas.microsoft.com/office/drawing/2014/main" id="{B1B7CEAF-0F84-40FE-A64D-FD2325892BE0}"/>
+              </a:ext>
+            </a:extLst>
+          </p:cNvPr>
+          <p:cNvPicPr>
+            <a:picLocks noGrp="1" noChangeAspect="1"/>
+          </p:cNvPicPr>
+          <p:nvPr>
+            <p:ph idx="1"/>
+          </p:nvPr>
+        </p:nvPicPr>
+        <p:blipFill>
+          <a:blip r:embed="rId2">
+            <a:extLst>
+              <a:ext uri="{28A0092B-C50C-407E-A947-70E740481C1C}">
+                <a14:useLocalDpi xmlns:a14="http://schemas.microsoft.com/office/drawing/2010/main" val="0"/>
+              </a:ext>
+            </a:extLst>
+          </a:blip>
+          <a:stretch>
+            <a:fillRect/>
+          </a:stretch>
+        </p:blipFill>
+        <p:spPr>
+          <a:xfrm>
+            <a:off x="149542" y="339884"/>
+            <a:ext cx="11843475" cy="6121876"/>
+          </a:xfrm>
+        </p:spPr>
+      </p:pic>
+    </p:spTree>
+    <p:extLst>
+      <p:ext uri="{BB962C8B-B14F-4D97-AF65-F5344CB8AC3E}">
+        <p14:creationId xmlns:p14="http://schemas.microsoft.com/office/powerpoint/2010/main" val="1869490467"/>
+      </p:ext>
+    </p:extLst>
+  </p:cSld>
+  <p:clrMapOvr>
+    <a:masterClrMapping/>
+  </p:clrMapOvr>
+</p:sld>
+</file>
+
+<file path=ppt/slides/slide6.xml><?xml version="1.0" encoding="utf-8"?>
+<p:sld xmlns:a="http://schemas.openxmlformats.org/drawingml/2006/main" xmlns:r="http://schemas.openxmlformats.org/officeDocument/2006/relationships" xmlns:p="http://schemas.openxmlformats.org/presentationml/2006/main">
+  <p:cSld>
+    <p:spTree>
+      <p:nvGrpSpPr>
+        <p:cNvPr id="1" name=""/>
+        <p:cNvGrpSpPr/>
+        <p:nvPr/>
+      </p:nvGrpSpPr>
+      <p:grpSpPr>
+        <a:xfrm>
+          <a:off x="0" y="0"/>
+          <a:ext cx="0" cy="0"/>
+          <a:chOff x="0" y="0"/>
+          <a:chExt cx="0" cy="0"/>
+        </a:xfrm>
+      </p:grpSpPr>
+      <p:pic>
+        <p:nvPicPr>
+          <p:cNvPr id="5" name="Content Placeholder 4" descr="A close up of a sign&#10;&#10;Description automatically generated">
+            <a:extLst>
+              <a:ext uri="{FF2B5EF4-FFF2-40B4-BE49-F238E27FC236}">
+                <a16:creationId xmlns:a16="http://schemas.microsoft.com/office/drawing/2014/main" id="{B71B6B3B-D66A-4814-933C-AC5938969CE5}"/>
+              </a:ext>
+            </a:extLst>
+          </p:cNvPr>
+          <p:cNvPicPr>
+            <a:picLocks noGrp="1" noChangeAspect="1"/>
+          </p:cNvPicPr>
+          <p:nvPr>
+            <p:ph idx="1"/>
+          </p:nvPr>
+        </p:nvPicPr>
+        <p:blipFill>
+          <a:blip r:embed="rId2">
+            <a:extLst>
+              <a:ext uri="{28A0092B-C50C-407E-A947-70E740481C1C}">
+                <a14:useLocalDpi xmlns:a14="http://schemas.microsoft.com/office/drawing/2010/main" val="0"/>
+              </a:ext>
+            </a:extLst>
+          </a:blip>
+          <a:stretch>
+            <a:fillRect/>
+          </a:stretch>
+        </p:blipFill>
+        <p:spPr>
+          <a:xfrm>
+            <a:off x="1386386" y="225425"/>
+            <a:ext cx="9342574" cy="6411342"/>
+          </a:xfrm>
+        </p:spPr>
+      </p:pic>
+    </p:spTree>
+    <p:extLst>
+      <p:ext uri="{BB962C8B-B14F-4D97-AF65-F5344CB8AC3E}">
+        <p14:creationId xmlns:p14="http://schemas.microsoft.com/office/powerpoint/2010/main" val="59836107"/>
+      </p:ext>
+    </p:extLst>
+  </p:cSld>
+  <p:clrMapOvr>
+    <a:masterClrMapping/>
+  </p:clrMapOvr>
+</p:sld>
+</file>
+
+<file path=ppt/slides/slide7.xml><?xml version="1.0" encoding="utf-8"?>
+<p:sld xmlns:a="http://schemas.openxmlformats.org/drawingml/2006/main" xmlns:r="http://schemas.openxmlformats.org/officeDocument/2006/relationships" xmlns:p="http://schemas.openxmlformats.org/presentationml/2006/main">
+  <p:cSld>
+    <p:spTree>
+      <p:nvGrpSpPr>
+        <p:cNvPr id="1" name=""/>
+        <p:cNvGrpSpPr/>
+        <p:nvPr/>
+      </p:nvGrpSpPr>
+      <p:grpSpPr>
+        <a:xfrm>
+          <a:off x="0" y="0"/>
+          <a:ext cx="0" cy="0"/>
+          <a:chOff x="0" y="0"/>
+          <a:chExt cx="0" cy="0"/>
+        </a:xfrm>
+      </p:grpSpPr>
+      <p:pic>
+        <p:nvPicPr>
+          <p:cNvPr id="5" name="Picture 4" descr="A picture containing sky&#10;&#10;Description generated with very high confidence"/>
+          <p:cNvPicPr>
+            <a:picLocks noChangeAspect="1"/>
+          </p:cNvPicPr>
+          <p:nvPr/>
+        </p:nvPicPr>
+        <p:blipFill>
+          <a:blip r:embed="rId2">
+            <a:extLst>
+              <a:ext uri="{28A0092B-C50C-407E-A947-70E740481C1C}">
+                <a14:useLocalDpi xmlns:a14="http://schemas.microsoft.com/office/drawing/2010/main" val="0"/>
+              </a:ext>
+            </a:extLst>
+          </a:blip>
+          <a:stretch>
+            <a:fillRect/>
+          </a:stretch>
+        </p:blipFill>
+        <p:spPr>
+          <a:xfrm>
+            <a:off x="0" y="0"/>
+            <a:ext cx="12192000" cy="6850035"/>
+          </a:xfrm>
+          <a:prstGeom prst="rect">
+            <a:avLst/>
+          </a:prstGeom>
+        </p:spPr>
+      </p:pic>
+    </p:spTree>
+    <p:extLst>
+      <p:ext uri="{BB962C8B-B14F-4D97-AF65-F5344CB8AC3E}">
+        <p14:creationId xmlns:p14="http://schemas.microsoft.com/office/powerpoint/2010/main" val="3995299784"/>
+      </p:ext>
+    </p:extLst>
+  </p:cSld>
+  <p:clrMapOvr>
+    <a:masterClrMapping/>
+  </p:clrMapOvr>
+  <mc:AlternateContent xmlns:mc="http://schemas.openxmlformats.org/markup-compatibility/2006" xmlns:p14="http://schemas.microsoft.com/office/powerpoint/2010/main">
+    <mc:Choice Requires="p14">
+      <p:transition spd="slow" p14:dur="800">
+        <p14:flythrough/>
+      </p:transition>
+    </mc:Choice>
+    <mc:Fallback xmlns="">
+      <p:transition spd="slow">
+        <p:fade/>
+      </p:transition>
+    </mc:Fallback>
+  </mc:AlternateContent>
+</p:sld>
+</file>
+
+<file path=ppt/slides/slide8.xml><?xml version="1.0" encoding="utf-8"?>
+<p:sld xmlns:a="http://schemas.openxmlformats.org/drawingml/2006/main" xmlns:r="http://schemas.openxmlformats.org/officeDocument/2006/relationships" xmlns:p="http://schemas.openxmlformats.org/presentationml/2006/main">
+  <p:cSld>
+    <p:spTree>
+      <p:nvGrpSpPr>
+        <p:cNvPr id="1" name=""/>
+        <p:cNvGrpSpPr/>
+        <p:nvPr/>
+      </p:nvGrpSpPr>
+      <p:grpSpPr>
+        <a:xfrm>
+          <a:off x="0" y="0"/>
+          <a:ext cx="0" cy="0"/>
+          <a:chOff x="0" y="0"/>
+          <a:chExt cx="0" cy="0"/>
+        </a:xfrm>
+      </p:grpSpPr>
+      <p:sp>
+        <p:nvSpPr>
+          <p:cNvPr id="2" name="Content Placeholder 1"/>
+          <p:cNvSpPr>
+            <a:spLocks noGrp="1"/>
+          </p:cNvSpPr>
+          <p:nvPr>
+            <p:ph idx="1"/>
+          </p:nvPr>
+        </p:nvSpPr>
+        <p:spPr>
+          <a:xfrm>
+            <a:off x="2828639" y="3104964"/>
+            <a:ext cx="6534725" cy="2588022"/>
+          </a:xfrm>
+        </p:spPr>
+        <p:txBody>
+          <a:bodyPr>
+            <a:normAutofit/>
+          </a:bodyPr>
+          <a:lstStyle/>
+          <a:p>
+            <a:pPr marL="0" indent="0" algn="ctr">
+              <a:buNone/>
+            </a:pPr>
+            <a:r>
+              <a:rPr lang="en-IN" sz="3600" dirty="0">
+                <a:latin typeface="Times New Roman" panose="02020603050405020304" pitchFamily="18" charset="0"/>
+                <a:cs typeface="Times New Roman" panose="02020603050405020304" pitchFamily="18" charset="0"/>
+              </a:rPr>
+              <a:t>Cloud Computing is the delivery of services such as storage, computation, networking etc to the customer on demand</a:t>
+            </a:r>
+          </a:p>
+        </p:txBody>
+      </p:sp>
+      <p:sp>
+        <p:nvSpPr>
+          <p:cNvPr id="3" name="Title 2"/>
+          <p:cNvSpPr>
+            <a:spLocks noGrp="1"/>
+          </p:cNvSpPr>
+          <p:nvPr>
+            <p:ph type="title"/>
+          </p:nvPr>
+        </p:nvSpPr>
+        <p:spPr/>
+        <p:txBody>
+          <a:bodyPr>
+            <a:normAutofit/>
+          </a:bodyPr>
+          <a:lstStyle/>
+          <a:p>
+            <a:r>
+              <a:rPr lang="en-IN" sz="4400" b="1" dirty="0">
+                <a:latin typeface="Times New Roman" panose="02020603050405020304" pitchFamily="18" charset="0"/>
+                <a:cs typeface="Times New Roman" panose="02020603050405020304" pitchFamily="18" charset="0"/>
+              </a:rPr>
+              <a:t>What is Cloud Computing</a:t>
+            </a:r>
+          </a:p>
+        </p:txBody>
+      </p:sp>
+    </p:spTree>
+    <p:extLst>
+      <p:ext uri="{BB962C8B-B14F-4D97-AF65-F5344CB8AC3E}">
+        <p14:creationId xmlns:p14="http://schemas.microsoft.com/office/powerpoint/2010/main" val="1815045627"/>
+      </p:ext>
+    </p:extLst>
+  </p:cSld>
+  <p:clrMapOvr>
+    <a:masterClrMapping/>
+  </p:clrMapOvr>
+  <mc:AlternateContent xmlns:mc="http://schemas.openxmlformats.org/markup-compatibility/2006" xmlns:p14="http://schemas.microsoft.com/office/powerpoint/2010/main">
+    <mc:Choice Requires="p14">
+      <p:transition spd="slow" p14:dur="800">
+        <p14:flythrough/>
+      </p:transition>
+    </mc:Choice>
+    <mc:Fallback xmlns="">
+      <p:transition spd="slow">
+        <p:fade/>
+      </p:transition>
+    </mc:Fallback>
+  </mc:AlternateContent>
+</p:sld>
+</file>
+
+<file path=ppt/slides/slide9.xml><?xml version="1.0" encoding="utf-8"?>
+<p:sld xmlns:a="http://schemas.openxmlformats.org/drawingml/2006/main" xmlns:r="http://schemas.openxmlformats.org/officeDocument/2006/relationships" xmlns:p="http://schemas.openxmlformats.org/presentationml/2006/main">
+  <p:cSld>
+    <p:spTree>
+      <p:nvGrpSpPr>
+        <p:cNvPr id="1" name=""/>
+        <p:cNvGrpSpPr/>
+        <p:nvPr/>
+      </p:nvGrpSpPr>
+      <p:grpSpPr>
+        <a:xfrm>
+          <a:off x="0" y="0"/>
+          <a:ext cx="0" cy="0"/>
+          <a:chOff x="0" y="0"/>
+          <a:chExt cx="0" cy="0"/>
+        </a:xfrm>
+      </p:grpSpPr>
+      <p:sp>
+        <p:nvSpPr>
+          <p:cNvPr id="2" name="Content Placeholder 1">
+            <a:extLst>
+              <a:ext uri="{FF2B5EF4-FFF2-40B4-BE49-F238E27FC236}">
+                <a16:creationId xmlns:a16="http://schemas.microsoft.com/office/drawing/2014/main" id="{C81A2BB4-E7FF-4C48-8916-9403A788C811}"/>
+              </a:ext>
+            </a:extLst>
+          </p:cNvPr>
+          <p:cNvSpPr>
+            <a:spLocks noGrp="1"/>
+          </p:cNvSpPr>
+          <p:nvPr>
+            <p:ph idx="1"/>
+          </p:nvPr>
+        </p:nvSpPr>
+        <p:spPr>
+          <a:xfrm>
+            <a:off x="2396069" y="2348881"/>
+            <a:ext cx="7408333" cy="4170791"/>
+          </a:xfrm>
+        </p:spPr>
+        <p:txBody>
+          <a:bodyPr>
+            <a:normAutofit/>
+          </a:bodyPr>
+          <a:lstStyle/>
+          <a:p>
+            <a:r>
+              <a:rPr lang="en-US" sz="3600" dirty="0"/>
+              <a:t>Scalability</a:t>
+            </a:r>
+          </a:p>
+          <a:p>
+            <a:r>
+              <a:rPr lang="en-US" sz="3600" dirty="0"/>
+              <a:t>Elasticity</a:t>
+            </a:r>
+          </a:p>
+          <a:p>
+            <a:r>
+              <a:rPr lang="en-US" sz="3600" dirty="0"/>
+              <a:t>Resource Pooling</a:t>
+            </a:r>
+          </a:p>
+          <a:p>
+            <a:r>
+              <a:rPr lang="en-US" sz="3600" dirty="0"/>
+              <a:t>Self Service</a:t>
+            </a:r>
+          </a:p>
+          <a:p>
+            <a:r>
+              <a:rPr lang="en-US" sz="3600" dirty="0"/>
+              <a:t>Low Cost</a:t>
+            </a:r>
+          </a:p>
+          <a:p>
+            <a:r>
+              <a:rPr lang="en-US" sz="3600" dirty="0"/>
+              <a:t>Fault Tolerance</a:t>
+            </a:r>
+          </a:p>
+        </p:txBody>
+      </p:sp>
+      <p:sp>
+        <p:nvSpPr>
+          <p:cNvPr id="3" name="Title 2">
+            <a:extLst>
+              <a:ext uri="{FF2B5EF4-FFF2-40B4-BE49-F238E27FC236}">
+                <a16:creationId xmlns:a16="http://schemas.microsoft.com/office/drawing/2014/main" id="{F825D5F7-0A2A-4E0E-911D-FAC4EA194E81}"/>
+              </a:ext>
+            </a:extLst>
+          </p:cNvPr>
+          <p:cNvSpPr>
+            <a:spLocks noGrp="1"/>
+          </p:cNvSpPr>
+          <p:nvPr>
+            <p:ph type="title"/>
+          </p:nvPr>
+        </p:nvSpPr>
+        <p:spPr/>
+        <p:txBody>
+          <a:bodyPr>
+            <a:normAutofit/>
+          </a:bodyPr>
+          <a:lstStyle/>
+          <a:p>
+            <a:r>
+              <a:rPr lang="en-US" sz="5400" b="1" dirty="0"/>
+              <a:t>Features</a:t>
+            </a:r>
+          </a:p>
+        </p:txBody>
+      </p:sp>
+    </p:spTree>
+    <p:extLst>
+      <p:ext uri="{BB962C8B-B14F-4D97-AF65-F5344CB8AC3E}">
+        <p14:creationId xmlns:p14="http://schemas.microsoft.com/office/powerpoint/2010/main" val="2575274937"/>
+      </p:ext>
+    </p:extLst>
+  </p:cSld>
+  <p:clrMapOvr>
+    <a:masterClrMapping/>
+  </p:clrMapOvr>
+  <mc:AlternateContent xmlns:mc="http://schemas.openxmlformats.org/markup-compatibility/2006" xmlns:p14="http://schemas.microsoft.com/office/powerpoint/2010/main">
+    <mc:Choice Requires="p14">
+      <p:transition spd="slow" p14:dur="800">
+        <p14:flythrough/>
+      </p:transition>
+    </mc:Choice>
+    <mc:Fallback xmlns="">
+      <p:transition spd="slow">
+        <p:fade/>
+      </p:transition>
+    </mc:Fallback>
+  </mc:AlternateContent>
 </p:sld>
 </file>
 

</xml_diff>